<commit_message>
Time for other work
</commit_message>
<xml_diff>
--- a/slides/les1_heroopquest.pptx
+++ b/slides/les1_heroopquest.pptx
@@ -273,7 +273,7 @@
           <a:p>
             <a:fld id="{E967DB92-F44E-46A9-98A3-9A9E4D93AB0C}" type="datetimeFigureOut">
               <a:rPr lang="nl-BE" smtClean="0"/>
-              <a:t>17/02/2020</a:t>
+              <a:t>19/02/2020</a:t>
             </a:fld>
             <a:endParaRPr lang="nl-BE"/>
           </a:p>
@@ -473,7 +473,7 @@
           <a:p>
             <a:fld id="{E967DB92-F44E-46A9-98A3-9A9E4D93AB0C}" type="datetimeFigureOut">
               <a:rPr lang="nl-BE" smtClean="0"/>
-              <a:t>17/02/2020</a:t>
+              <a:t>19/02/2020</a:t>
             </a:fld>
             <a:endParaRPr lang="nl-BE"/>
           </a:p>
@@ -683,7 +683,7 @@
           <a:p>
             <a:fld id="{E967DB92-F44E-46A9-98A3-9A9E4D93AB0C}" type="datetimeFigureOut">
               <a:rPr lang="nl-BE" smtClean="0"/>
-              <a:t>17/02/2020</a:t>
+              <a:t>19/02/2020</a:t>
             </a:fld>
             <a:endParaRPr lang="nl-BE"/>
           </a:p>
@@ -883,7 +883,7 @@
           <a:p>
             <a:fld id="{E967DB92-F44E-46A9-98A3-9A9E4D93AB0C}" type="datetimeFigureOut">
               <a:rPr lang="nl-BE" smtClean="0"/>
-              <a:t>17/02/2020</a:t>
+              <a:t>19/02/2020</a:t>
             </a:fld>
             <a:endParaRPr lang="nl-BE"/>
           </a:p>
@@ -1159,7 +1159,7 @@
           <a:p>
             <a:fld id="{E967DB92-F44E-46A9-98A3-9A9E4D93AB0C}" type="datetimeFigureOut">
               <a:rPr lang="nl-BE" smtClean="0"/>
-              <a:t>17/02/2020</a:t>
+              <a:t>19/02/2020</a:t>
             </a:fld>
             <a:endParaRPr lang="nl-BE"/>
           </a:p>
@@ -1427,7 +1427,7 @@
           <a:p>
             <a:fld id="{E967DB92-F44E-46A9-98A3-9A9E4D93AB0C}" type="datetimeFigureOut">
               <a:rPr lang="nl-BE" smtClean="0"/>
-              <a:t>17/02/2020</a:t>
+              <a:t>19/02/2020</a:t>
             </a:fld>
             <a:endParaRPr lang="nl-BE"/>
           </a:p>
@@ -1842,7 +1842,7 @@
           <a:p>
             <a:fld id="{E967DB92-F44E-46A9-98A3-9A9E4D93AB0C}" type="datetimeFigureOut">
               <a:rPr lang="nl-BE" smtClean="0"/>
-              <a:t>17/02/2020</a:t>
+              <a:t>19/02/2020</a:t>
             </a:fld>
             <a:endParaRPr lang="nl-BE"/>
           </a:p>
@@ -1984,7 +1984,7 @@
           <a:p>
             <a:fld id="{E967DB92-F44E-46A9-98A3-9A9E4D93AB0C}" type="datetimeFigureOut">
               <a:rPr lang="nl-BE" smtClean="0"/>
-              <a:t>17/02/2020</a:t>
+              <a:t>19/02/2020</a:t>
             </a:fld>
             <a:endParaRPr lang="nl-BE"/>
           </a:p>
@@ -2097,7 +2097,7 @@
           <a:p>
             <a:fld id="{E967DB92-F44E-46A9-98A3-9A9E4D93AB0C}" type="datetimeFigureOut">
               <a:rPr lang="nl-BE" smtClean="0"/>
-              <a:t>17/02/2020</a:t>
+              <a:t>19/02/2020</a:t>
             </a:fld>
             <a:endParaRPr lang="nl-BE"/>
           </a:p>
@@ -2410,7 +2410,7 @@
           <a:p>
             <a:fld id="{E967DB92-F44E-46A9-98A3-9A9E4D93AB0C}" type="datetimeFigureOut">
               <a:rPr lang="nl-BE" smtClean="0"/>
-              <a:t>17/02/2020</a:t>
+              <a:t>19/02/2020</a:t>
             </a:fld>
             <a:endParaRPr lang="nl-BE"/>
           </a:p>
@@ -2699,7 +2699,7 @@
           <a:p>
             <a:fld id="{E967DB92-F44E-46A9-98A3-9A9E4D93AB0C}" type="datetimeFigureOut">
               <a:rPr lang="nl-BE" smtClean="0"/>
-              <a:t>17/02/2020</a:t>
+              <a:t>19/02/2020</a:t>
             </a:fld>
             <a:endParaRPr lang="nl-BE"/>
           </a:p>
@@ -2942,7 +2942,7 @@
           <a:p>
             <a:fld id="{E967DB92-F44E-46A9-98A3-9A9E4D93AB0C}" type="datetimeFigureOut">
               <a:rPr lang="nl-BE" smtClean="0"/>
-              <a:t>17/02/2020</a:t>
+              <a:t>19/02/2020</a:t>
             </a:fld>
             <a:endParaRPr lang="nl-BE"/>
           </a:p>
@@ -3599,8 +3599,8 @@
               <a:t> </a:t>
             </a:r>
             <a:r>
-              <a:rPr lang="nl-BE" sz="4000" dirty="0" err="1"/>
-              <a:t>Heroquest</a:t>
+              <a:rPr lang="nl-BE" sz="4000"/>
+              <a:t>Heroopquest</a:t>
             </a:r>
             <a:endParaRPr lang="nl-BE" sz="4000" dirty="0"/>
           </a:p>
@@ -6228,13 +6228,13 @@
   <p:clrMapOvr>
     <a:masterClrMapping/>
   </p:clrMapOvr>
-  <mc:AlternateContent xmlns:mc="http://schemas.openxmlformats.org/markup-compatibility/2006">
-    <mc:Choice xmlns:p15="http://schemas.microsoft.com/office/powerpoint/2012/main" Requires="p15">
+  <mc:AlternateContent xmlns:mc="http://schemas.openxmlformats.org/markup-compatibility/2006" xmlns:p15="http://schemas.microsoft.com/office/powerpoint/2012/main">
+    <mc:Choice Requires="p15">
       <p:transition xmlns:p14="http://schemas.microsoft.com/office/powerpoint/2010/main" spd="slow" p14:dur="4000">
         <p15:prstTrans prst="curtains"/>
       </p:transition>
     </mc:Choice>
-    <mc:Fallback>
+    <mc:Fallback xmlns="">
       <p:transition spd="slow">
         <p:fade/>
       </p:transition>

</xml_diff>

<commit_message>
prepping slides fase 1
</commit_message>
<xml_diff>
--- a/slides/les1_heroopquest.pptx
+++ b/slides/les1_heroopquest.pptx
@@ -13,11 +13,7 @@
     <p:sldId id="258" r:id="rId7"/>
     <p:sldId id="260" r:id="rId8"/>
     <p:sldId id="261" r:id="rId9"/>
-    <p:sldId id="268" r:id="rId10"/>
-    <p:sldId id="264" r:id="rId11"/>
-    <p:sldId id="265" r:id="rId12"/>
-    <p:sldId id="267" r:id="rId13"/>
-    <p:sldId id="266" r:id="rId14"/>
+    <p:sldId id="264" r:id="rId10"/>
   </p:sldIdLst>
   <p:sldSz cx="12192000" cy="6858000"/>
   <p:notesSz cx="6858000" cy="9144000"/>
@@ -3710,838 +3706,6 @@
 </p:sld>
 </file>
 
-<file path=ppt/slides/slide10.xml><?xml version="1.0" encoding="utf-8"?>
-<p:sld xmlns:a="http://schemas.openxmlformats.org/drawingml/2006/main" xmlns:r="http://schemas.openxmlformats.org/officeDocument/2006/relationships" xmlns:p="http://schemas.openxmlformats.org/presentationml/2006/main">
-  <p:cSld>
-    <p:spTree>
-      <p:nvGrpSpPr>
-        <p:cNvPr id="1" name=""/>
-        <p:cNvGrpSpPr/>
-        <p:nvPr/>
-      </p:nvGrpSpPr>
-      <p:grpSpPr>
-        <a:xfrm>
-          <a:off x="0" y="0"/>
-          <a:ext cx="0" cy="0"/>
-          <a:chOff x="0" y="0"/>
-          <a:chExt cx="0" cy="0"/>
-        </a:xfrm>
-      </p:grpSpPr>
-      <p:sp>
-        <p:nvSpPr>
-          <p:cNvPr id="2" name="Titel 1">
-            <a:extLst>
-              <a:ext uri="{FF2B5EF4-FFF2-40B4-BE49-F238E27FC236}">
-                <a16:creationId xmlns:a16="http://schemas.microsoft.com/office/drawing/2014/main" id="{41221588-08D6-4752-B4DE-462F560A621E}"/>
-              </a:ext>
-            </a:extLst>
-          </p:cNvPr>
-          <p:cNvSpPr>
-            <a:spLocks noGrp="1"/>
-          </p:cNvSpPr>
-          <p:nvPr>
-            <p:ph type="title"/>
-          </p:nvPr>
-        </p:nvSpPr>
-        <p:spPr/>
-        <p:txBody>
-          <a:bodyPr/>
-          <a:lstStyle/>
-          <a:p>
-            <a:r>
-              <a:rPr lang="nl-BE" dirty="0"/>
-              <a:t>Opzoeken in tijden zonder internet</a:t>
-            </a:r>
-          </a:p>
-        </p:txBody>
-      </p:sp>
-      <p:pic>
-        <p:nvPicPr>
-          <p:cNvPr id="1026" name="Picture 2">
-            <a:extLst>
-              <a:ext uri="{FF2B5EF4-FFF2-40B4-BE49-F238E27FC236}">
-                <a16:creationId xmlns:a16="http://schemas.microsoft.com/office/drawing/2014/main" id="{75F23FD0-4659-46DE-AE85-B29FCAB1A418}"/>
-              </a:ext>
-            </a:extLst>
-          </p:cNvPr>
-          <p:cNvPicPr>
-            <a:picLocks noChangeAspect="1" noChangeArrowheads="1"/>
-          </p:cNvPicPr>
-          <p:nvPr/>
-        </p:nvPicPr>
-        <p:blipFill>
-          <a:blip r:embed="rId2">
-            <a:extLst>
-              <a:ext uri="{28A0092B-C50C-407E-A947-70E740481C1C}">
-                <a14:useLocalDpi xmlns:a14="http://schemas.microsoft.com/office/drawing/2010/main" val="0"/>
-              </a:ext>
-            </a:extLst>
-          </a:blip>
-          <a:srcRect/>
-          <a:stretch>
-            <a:fillRect/>
-          </a:stretch>
-        </p:blipFill>
-        <p:spPr bwMode="auto">
-          <a:xfrm>
-            <a:off x="4711959" y="1189653"/>
-            <a:ext cx="6571861" cy="6571861"/>
-          </a:xfrm>
-          <a:prstGeom prst="rect">
-            <a:avLst/>
-          </a:prstGeom>
-          <a:noFill/>
-          <a:extLst>
-            <a:ext uri="{909E8E84-426E-40DD-AFC4-6F175D3DCCD1}">
-              <a14:hiddenFill xmlns:a14="http://schemas.microsoft.com/office/drawing/2010/main">
-                <a:solidFill>
-                  <a:srgbClr val="FFFFFF"/>
-                </a:solidFill>
-              </a14:hiddenFill>
-            </a:ext>
-          </a:extLst>
-        </p:spPr>
-      </p:pic>
-      <p:pic>
-        <p:nvPicPr>
-          <p:cNvPr id="1028" name="Picture 4">
-            <a:extLst>
-              <a:ext uri="{FF2B5EF4-FFF2-40B4-BE49-F238E27FC236}">
-                <a16:creationId xmlns:a16="http://schemas.microsoft.com/office/drawing/2014/main" id="{A3AF3E86-D049-4B5E-9929-ED614FEEB6CD}"/>
-              </a:ext>
-            </a:extLst>
-          </p:cNvPr>
-          <p:cNvPicPr>
-            <a:picLocks noGrp="1" noChangeAspect="1" noChangeArrowheads="1"/>
-          </p:cNvPicPr>
-          <p:nvPr>
-            <p:ph idx="1"/>
-          </p:nvPr>
-        </p:nvPicPr>
-        <p:blipFill>
-          <a:blip r:embed="rId3">
-            <a:extLst>
-              <a:ext uri="{28A0092B-C50C-407E-A947-70E740481C1C}">
-                <a14:useLocalDpi xmlns:a14="http://schemas.microsoft.com/office/drawing/2010/main" val="0"/>
-              </a:ext>
-            </a:extLst>
-          </a:blip>
-          <a:srcRect/>
-          <a:stretch>
-            <a:fillRect/>
-          </a:stretch>
-        </p:blipFill>
-        <p:spPr bwMode="auto">
-          <a:xfrm>
-            <a:off x="533319" y="2600066"/>
-            <a:ext cx="4351338" cy="4351338"/>
-          </a:xfrm>
-          <a:prstGeom prst="rect">
-            <a:avLst/>
-          </a:prstGeom>
-          <a:noFill/>
-          <a:extLst>
-            <a:ext uri="{909E8E84-426E-40DD-AFC4-6F175D3DCCD1}">
-              <a14:hiddenFill xmlns:a14="http://schemas.microsoft.com/office/drawing/2010/main">
-                <a:solidFill>
-                  <a:srgbClr val="FFFFFF"/>
-                </a:solidFill>
-              </a14:hiddenFill>
-            </a:ext>
-          </a:extLst>
-        </p:spPr>
-      </p:pic>
-    </p:spTree>
-    <p:extLst>
-      <p:ext uri="{BB962C8B-B14F-4D97-AF65-F5344CB8AC3E}">
-        <p14:creationId xmlns:p14="http://schemas.microsoft.com/office/powerpoint/2010/main" val="1276504459"/>
-      </p:ext>
-    </p:extLst>
-  </p:cSld>
-  <p:clrMapOvr>
-    <a:masterClrMapping/>
-  </p:clrMapOvr>
-</p:sld>
-</file>
-
-<file path=ppt/slides/slide11.xml><?xml version="1.0" encoding="utf-8"?>
-<p:sld xmlns:a="http://schemas.openxmlformats.org/drawingml/2006/main" xmlns:r="http://schemas.openxmlformats.org/officeDocument/2006/relationships" xmlns:p="http://schemas.openxmlformats.org/presentationml/2006/main">
-  <p:cSld>
-    <p:spTree>
-      <p:nvGrpSpPr>
-        <p:cNvPr id="1" name=""/>
-        <p:cNvGrpSpPr/>
-        <p:nvPr/>
-      </p:nvGrpSpPr>
-      <p:grpSpPr>
-        <a:xfrm>
-          <a:off x="0" y="0"/>
-          <a:ext cx="0" cy="0"/>
-          <a:chOff x="0" y="0"/>
-          <a:chExt cx="0" cy="0"/>
-        </a:xfrm>
-      </p:grpSpPr>
-      <p:sp>
-        <p:nvSpPr>
-          <p:cNvPr id="2" name="Titel 1">
-            <a:extLst>
-              <a:ext uri="{FF2B5EF4-FFF2-40B4-BE49-F238E27FC236}">
-                <a16:creationId xmlns:a16="http://schemas.microsoft.com/office/drawing/2014/main" id="{0162E827-1C5C-4F40-97CA-088DA1520608}"/>
-              </a:ext>
-            </a:extLst>
-          </p:cNvPr>
-          <p:cNvSpPr>
-            <a:spLocks noGrp="1"/>
-          </p:cNvSpPr>
-          <p:nvPr>
-            <p:ph type="title"/>
-          </p:nvPr>
-        </p:nvSpPr>
-        <p:spPr/>
-        <p:txBody>
-          <a:bodyPr/>
-          <a:lstStyle/>
-          <a:p>
-            <a:r>
-              <a:rPr lang="nl-BE" dirty="0"/>
-              <a:t>Encarta</a:t>
-            </a:r>
-          </a:p>
-        </p:txBody>
-      </p:sp>
-      <p:pic>
-        <p:nvPicPr>
-          <p:cNvPr id="4" name="Onlinemedia 3" title="Microsoft Encarta 1994">
-            <a:hlinkClick r:id="" action="ppaction://media"/>
-            <a:extLst>
-              <a:ext uri="{FF2B5EF4-FFF2-40B4-BE49-F238E27FC236}">
-                <a16:creationId xmlns:a16="http://schemas.microsoft.com/office/drawing/2014/main" id="{D1C17961-F9B3-47BD-8A8C-FE409BBC7F92}"/>
-              </a:ext>
-            </a:extLst>
-          </p:cNvPr>
-          <p:cNvPicPr>
-            <a:picLocks noGrp="1" noRot="1" noChangeAspect="1"/>
-          </p:cNvPicPr>
-          <p:nvPr>
-            <p:ph idx="1"/>
-            <a:videoFile r:link="rId1"/>
-          </p:nvPr>
-        </p:nvPicPr>
-        <p:blipFill>
-          <a:blip r:embed="rId3"/>
-          <a:stretch>
-            <a:fillRect/>
-          </a:stretch>
-        </p:blipFill>
-        <p:spPr>
-          <a:xfrm>
-            <a:off x="2959198" y="365125"/>
-            <a:ext cx="8508124" cy="6377023"/>
-          </a:xfrm>
-          <a:prstGeom prst="rect">
-            <a:avLst/>
-          </a:prstGeom>
-        </p:spPr>
-      </p:pic>
-    </p:spTree>
-    <p:extLst>
-      <p:ext uri="{BB962C8B-B14F-4D97-AF65-F5344CB8AC3E}">
-        <p14:creationId xmlns:p14="http://schemas.microsoft.com/office/powerpoint/2010/main" val="3670223421"/>
-      </p:ext>
-    </p:extLst>
-  </p:cSld>
-  <p:clrMapOvr>
-    <a:masterClrMapping/>
-  </p:clrMapOvr>
-  <p:timing>
-    <p:tnLst>
-      <p:par>
-        <p:cTn id="1" dur="indefinite" restart="never" nodeType="tmRoot">
-          <p:childTnLst>
-            <p:seq concurrent="1" nextAc="seek">
-              <p:cTn id="2" dur="indefinite" nodeType="mainSeq">
-                <p:childTnLst>
-                  <p:par>
-                    <p:cTn id="3" fill="hold">
-                      <p:stCondLst>
-                        <p:cond delay="indefinite"/>
-                      </p:stCondLst>
-                      <p:childTnLst>
-                        <p:par>
-                          <p:cTn id="4" fill="hold">
-                            <p:stCondLst>
-                              <p:cond delay="0"/>
-                            </p:stCondLst>
-                            <p:childTnLst>
-                              <p:par>
-                                <p:cTn id="5" presetID="1" presetClass="mediacall" presetSubtype="0" fill="hold" nodeType="clickEffect">
-                                  <p:stCondLst>
-                                    <p:cond delay="0"/>
-                                  </p:stCondLst>
-                                  <p:childTnLst>
-                                    <p:cmd type="call" cmd="playFrom(0.0)">
-                                      <p:cBhvr>
-                                        <p:cTn id="6" dur="1" fill="hold"/>
-                                        <p:tgtEl>
-                                          <p:spTgt spid="4"/>
-                                        </p:tgtEl>
-                                      </p:cBhvr>
-                                    </p:cmd>
-                                  </p:childTnLst>
-                                </p:cTn>
-                              </p:par>
-                            </p:childTnLst>
-                          </p:cTn>
-                        </p:par>
-                      </p:childTnLst>
-                    </p:cTn>
-                  </p:par>
-                </p:childTnLst>
-              </p:cTn>
-              <p:prevCondLst>
-                <p:cond evt="onPrev" delay="0">
-                  <p:tgtEl>
-                    <p:sldTgt/>
-                  </p:tgtEl>
-                </p:cond>
-              </p:prevCondLst>
-              <p:nextCondLst>
-                <p:cond evt="onNext" delay="0">
-                  <p:tgtEl>
-                    <p:sldTgt/>
-                  </p:tgtEl>
-                </p:cond>
-              </p:nextCondLst>
-            </p:seq>
-            <p:video>
-              <p:cMediaNode vol="80000">
-                <p:cTn id="7" fill="hold" display="0">
-                  <p:stCondLst>
-                    <p:cond delay="indefinite"/>
-                  </p:stCondLst>
-                </p:cTn>
-                <p:tgtEl>
-                  <p:spTgt spid="4"/>
-                </p:tgtEl>
-              </p:cMediaNode>
-            </p:video>
-            <p:seq concurrent="1" nextAc="seek">
-              <p:cTn id="8" restart="whenNotActive" fill="hold" evtFilter="cancelBubble" nodeType="interactiveSeq">
-                <p:stCondLst>
-                  <p:cond evt="onClick" delay="0">
-                    <p:tgtEl>
-                      <p:spTgt spid="4"/>
-                    </p:tgtEl>
-                  </p:cond>
-                </p:stCondLst>
-                <p:endSync evt="end" delay="0">
-                  <p:rtn val="all"/>
-                </p:endSync>
-                <p:childTnLst>
-                  <p:par>
-                    <p:cTn id="9" fill="hold">
-                      <p:stCondLst>
-                        <p:cond delay="0"/>
-                      </p:stCondLst>
-                      <p:childTnLst>
-                        <p:par>
-                          <p:cTn id="10" fill="hold">
-                            <p:stCondLst>
-                              <p:cond delay="0"/>
-                            </p:stCondLst>
-                            <p:childTnLst>
-                              <p:par>
-                                <p:cTn id="11" presetID="2" presetClass="mediacall" presetSubtype="0" fill="hold" nodeType="clickEffect">
-                                  <p:stCondLst>
-                                    <p:cond delay="0"/>
-                                  </p:stCondLst>
-                                  <p:childTnLst>
-                                    <p:cmd type="call" cmd="togglePause">
-                                      <p:cBhvr>
-                                        <p:cTn id="12" dur="1" fill="hold"/>
-                                        <p:tgtEl>
-                                          <p:spTgt spid="4"/>
-                                        </p:tgtEl>
-                                      </p:cBhvr>
-                                    </p:cmd>
-                                  </p:childTnLst>
-                                </p:cTn>
-                              </p:par>
-                            </p:childTnLst>
-                          </p:cTn>
-                        </p:par>
-                      </p:childTnLst>
-                    </p:cTn>
-                  </p:par>
-                </p:childTnLst>
-              </p:cTn>
-              <p:nextCondLst>
-                <p:cond evt="onClick" delay="0">
-                  <p:tgtEl>
-                    <p:spTgt spid="4"/>
-                  </p:tgtEl>
-                </p:cond>
-              </p:nextCondLst>
-            </p:seq>
-          </p:childTnLst>
-        </p:cTn>
-      </p:par>
-    </p:tnLst>
-  </p:timing>
-</p:sld>
-</file>
-
-<file path=ppt/slides/slide12.xml><?xml version="1.0" encoding="utf-8"?>
-<p:sld xmlns:a="http://schemas.openxmlformats.org/drawingml/2006/main" xmlns:r="http://schemas.openxmlformats.org/officeDocument/2006/relationships" xmlns:p="http://schemas.openxmlformats.org/presentationml/2006/main">
-  <p:cSld>
-    <p:spTree>
-      <p:nvGrpSpPr>
-        <p:cNvPr id="1" name=""/>
-        <p:cNvGrpSpPr/>
-        <p:nvPr/>
-      </p:nvGrpSpPr>
-      <p:grpSpPr>
-        <a:xfrm>
-          <a:off x="0" y="0"/>
-          <a:ext cx="0" cy="0"/>
-          <a:chOff x="0" y="0"/>
-          <a:chExt cx="0" cy="0"/>
-        </a:xfrm>
-      </p:grpSpPr>
-      <p:sp>
-        <p:nvSpPr>
-          <p:cNvPr id="2" name="Titel 1">
-            <a:extLst>
-              <a:ext uri="{FF2B5EF4-FFF2-40B4-BE49-F238E27FC236}">
-                <a16:creationId xmlns:a16="http://schemas.microsoft.com/office/drawing/2014/main" id="{BF3555ED-D454-407F-A760-B6A268BE9CC1}"/>
-              </a:ext>
-            </a:extLst>
-          </p:cNvPr>
-          <p:cNvSpPr>
-            <a:spLocks noGrp="1"/>
-          </p:cNvSpPr>
-          <p:nvPr>
-            <p:ph type="title"/>
-          </p:nvPr>
-        </p:nvSpPr>
-        <p:spPr/>
-        <p:txBody>
-          <a:bodyPr/>
-          <a:lstStyle/>
-          <a:p>
-            <a:endParaRPr lang="nl-BE"/>
-          </a:p>
-        </p:txBody>
-      </p:sp>
-      <p:pic>
-        <p:nvPicPr>
-          <p:cNvPr id="4" name="Onlinemedia 3" title="Using Windows 3.11 for the First Time">
-            <a:hlinkClick r:id="" action="ppaction://media"/>
-            <a:extLst>
-              <a:ext uri="{FF2B5EF4-FFF2-40B4-BE49-F238E27FC236}">
-                <a16:creationId xmlns:a16="http://schemas.microsoft.com/office/drawing/2014/main" id="{1E227357-E66A-4A55-890F-A23F48979E38}"/>
-              </a:ext>
-            </a:extLst>
-          </p:cNvPr>
-          <p:cNvPicPr>
-            <a:picLocks noGrp="1" noRot="1" noChangeAspect="1"/>
-          </p:cNvPicPr>
-          <p:nvPr>
-            <p:ph idx="1"/>
-            <a:videoFile r:link="rId1"/>
-          </p:nvPr>
-        </p:nvPicPr>
-        <p:blipFill>
-          <a:blip r:embed="rId3"/>
-          <a:stretch>
-            <a:fillRect/>
-          </a:stretch>
-        </p:blipFill>
-        <p:spPr>
-          <a:xfrm>
-            <a:off x="541176" y="365125"/>
-            <a:ext cx="11252718" cy="6329510"/>
-          </a:xfrm>
-          <a:prstGeom prst="rect">
-            <a:avLst/>
-          </a:prstGeom>
-        </p:spPr>
-      </p:pic>
-    </p:spTree>
-    <p:extLst>
-      <p:ext uri="{BB962C8B-B14F-4D97-AF65-F5344CB8AC3E}">
-        <p14:creationId xmlns:p14="http://schemas.microsoft.com/office/powerpoint/2010/main" val="391247975"/>
-      </p:ext>
-    </p:extLst>
-  </p:cSld>
-  <p:clrMapOvr>
-    <a:masterClrMapping/>
-  </p:clrMapOvr>
-  <p:timing>
-    <p:tnLst>
-      <p:par>
-        <p:cTn id="1" dur="indefinite" restart="never" nodeType="tmRoot">
-          <p:childTnLst>
-            <p:seq concurrent="1" nextAc="seek">
-              <p:cTn id="2" dur="indefinite" nodeType="mainSeq">
-                <p:childTnLst>
-                  <p:par>
-                    <p:cTn id="3" fill="hold">
-                      <p:stCondLst>
-                        <p:cond delay="indefinite"/>
-                      </p:stCondLst>
-                      <p:childTnLst>
-                        <p:par>
-                          <p:cTn id="4" fill="hold">
-                            <p:stCondLst>
-                              <p:cond delay="0"/>
-                            </p:stCondLst>
-                            <p:childTnLst>
-                              <p:par>
-                                <p:cTn id="5" presetID="1" presetClass="mediacall" presetSubtype="0" fill="hold" nodeType="clickEffect">
-                                  <p:stCondLst>
-                                    <p:cond delay="0"/>
-                                  </p:stCondLst>
-                                  <p:childTnLst>
-                                    <p:cmd type="call" cmd="playFrom(0.0)">
-                                      <p:cBhvr>
-                                        <p:cTn id="6" dur="1" fill="hold"/>
-                                        <p:tgtEl>
-                                          <p:spTgt spid="4"/>
-                                        </p:tgtEl>
-                                      </p:cBhvr>
-                                    </p:cmd>
-                                  </p:childTnLst>
-                                </p:cTn>
-                              </p:par>
-                            </p:childTnLst>
-                          </p:cTn>
-                        </p:par>
-                      </p:childTnLst>
-                    </p:cTn>
-                  </p:par>
-                </p:childTnLst>
-              </p:cTn>
-              <p:prevCondLst>
-                <p:cond evt="onPrev" delay="0">
-                  <p:tgtEl>
-                    <p:sldTgt/>
-                  </p:tgtEl>
-                </p:cond>
-              </p:prevCondLst>
-              <p:nextCondLst>
-                <p:cond evt="onNext" delay="0">
-                  <p:tgtEl>
-                    <p:sldTgt/>
-                  </p:tgtEl>
-                </p:cond>
-              </p:nextCondLst>
-            </p:seq>
-            <p:video>
-              <p:cMediaNode vol="80000">
-                <p:cTn id="7" fill="hold" display="0">
-                  <p:stCondLst>
-                    <p:cond delay="indefinite"/>
-                  </p:stCondLst>
-                </p:cTn>
-                <p:tgtEl>
-                  <p:spTgt spid="4"/>
-                </p:tgtEl>
-              </p:cMediaNode>
-            </p:video>
-            <p:seq concurrent="1" nextAc="seek">
-              <p:cTn id="8" restart="whenNotActive" fill="hold" evtFilter="cancelBubble" nodeType="interactiveSeq">
-                <p:stCondLst>
-                  <p:cond evt="onClick" delay="0">
-                    <p:tgtEl>
-                      <p:spTgt spid="4"/>
-                    </p:tgtEl>
-                  </p:cond>
-                </p:stCondLst>
-                <p:endSync evt="end" delay="0">
-                  <p:rtn val="all"/>
-                </p:endSync>
-                <p:childTnLst>
-                  <p:par>
-                    <p:cTn id="9" fill="hold">
-                      <p:stCondLst>
-                        <p:cond delay="0"/>
-                      </p:stCondLst>
-                      <p:childTnLst>
-                        <p:par>
-                          <p:cTn id="10" fill="hold">
-                            <p:stCondLst>
-                              <p:cond delay="0"/>
-                            </p:stCondLst>
-                            <p:childTnLst>
-                              <p:par>
-                                <p:cTn id="11" presetID="2" presetClass="mediacall" presetSubtype="0" fill="hold" nodeType="clickEffect">
-                                  <p:stCondLst>
-                                    <p:cond delay="0"/>
-                                  </p:stCondLst>
-                                  <p:childTnLst>
-                                    <p:cmd type="call" cmd="togglePause">
-                                      <p:cBhvr>
-                                        <p:cTn id="12" dur="1" fill="hold"/>
-                                        <p:tgtEl>
-                                          <p:spTgt spid="4"/>
-                                        </p:tgtEl>
-                                      </p:cBhvr>
-                                    </p:cmd>
-                                  </p:childTnLst>
-                                </p:cTn>
-                              </p:par>
-                            </p:childTnLst>
-                          </p:cTn>
-                        </p:par>
-                      </p:childTnLst>
-                    </p:cTn>
-                  </p:par>
-                </p:childTnLst>
-              </p:cTn>
-              <p:nextCondLst>
-                <p:cond evt="onClick" delay="0">
-                  <p:tgtEl>
-                    <p:spTgt spid="4"/>
-                  </p:tgtEl>
-                </p:cond>
-              </p:nextCondLst>
-            </p:seq>
-          </p:childTnLst>
-        </p:cTn>
-      </p:par>
-    </p:tnLst>
-  </p:timing>
-</p:sld>
-</file>
-
-<file path=ppt/slides/slide13.xml><?xml version="1.0" encoding="utf-8"?>
-<p:sld xmlns:a="http://schemas.openxmlformats.org/drawingml/2006/main" xmlns:r="http://schemas.openxmlformats.org/officeDocument/2006/relationships" xmlns:p="http://schemas.openxmlformats.org/presentationml/2006/main">
-  <p:cSld>
-    <p:spTree>
-      <p:nvGrpSpPr>
-        <p:cNvPr id="1" name=""/>
-        <p:cNvGrpSpPr/>
-        <p:nvPr/>
-      </p:nvGrpSpPr>
-      <p:grpSpPr>
-        <a:xfrm>
-          <a:off x="0" y="0"/>
-          <a:ext cx="0" cy="0"/>
-          <a:chOff x="0" y="0"/>
-          <a:chExt cx="0" cy="0"/>
-        </a:xfrm>
-      </p:grpSpPr>
-      <p:sp>
-        <p:nvSpPr>
-          <p:cNvPr id="2" name="Titel 1">
-            <a:extLst>
-              <a:ext uri="{FF2B5EF4-FFF2-40B4-BE49-F238E27FC236}">
-                <a16:creationId xmlns:a16="http://schemas.microsoft.com/office/drawing/2014/main" id="{051D2283-BA6F-420B-B085-35E2043033FC}"/>
-              </a:ext>
-            </a:extLst>
-          </p:cNvPr>
-          <p:cNvSpPr>
-            <a:spLocks noGrp="1"/>
-          </p:cNvSpPr>
-          <p:nvPr>
-            <p:ph type="title"/>
-          </p:nvPr>
-        </p:nvSpPr>
-        <p:spPr/>
-        <p:txBody>
-          <a:bodyPr/>
-          <a:lstStyle/>
-          <a:p>
-            <a:r>
-              <a:rPr lang="nl-BE" dirty="0"/>
-              <a:t>Microsoft Bob</a:t>
-            </a:r>
-          </a:p>
-        </p:txBody>
-      </p:sp>
-      <p:pic>
-        <p:nvPicPr>
-          <p:cNvPr id="4" name="Onlinemedia 3" title="Microsoft BOB - A tour of Microsoft's forgotten desktop &quot;enhancement&quot;">
-            <a:hlinkClick r:id="" action="ppaction://media"/>
-            <a:extLst>
-              <a:ext uri="{FF2B5EF4-FFF2-40B4-BE49-F238E27FC236}">
-                <a16:creationId xmlns:a16="http://schemas.microsoft.com/office/drawing/2014/main" id="{3EA2717F-900B-468C-A3C9-E45BFF0CD79E}"/>
-              </a:ext>
-            </a:extLst>
-          </p:cNvPr>
-          <p:cNvPicPr>
-            <a:picLocks noGrp="1" noRot="1" noChangeAspect="1"/>
-          </p:cNvPicPr>
-          <p:nvPr>
-            <p:ph idx="1"/>
-            <a:videoFile r:link="rId1"/>
-          </p:nvPr>
-        </p:nvPicPr>
-        <p:blipFill>
-          <a:blip r:embed="rId3"/>
-          <a:stretch>
-            <a:fillRect/>
-          </a:stretch>
-        </p:blipFill>
-        <p:spPr>
-          <a:xfrm>
-            <a:off x="3052504" y="1577492"/>
-            <a:ext cx="6558027" cy="4915383"/>
-          </a:xfrm>
-          <a:prstGeom prst="rect">
-            <a:avLst/>
-          </a:prstGeom>
-        </p:spPr>
-      </p:pic>
-    </p:spTree>
-    <p:extLst>
-      <p:ext uri="{BB962C8B-B14F-4D97-AF65-F5344CB8AC3E}">
-        <p14:creationId xmlns:p14="http://schemas.microsoft.com/office/powerpoint/2010/main" val="1932984901"/>
-      </p:ext>
-    </p:extLst>
-  </p:cSld>
-  <p:clrMapOvr>
-    <a:masterClrMapping/>
-  </p:clrMapOvr>
-  <p:timing>
-    <p:tnLst>
-      <p:par>
-        <p:cTn id="1" dur="indefinite" restart="never" nodeType="tmRoot">
-          <p:childTnLst>
-            <p:seq concurrent="1" nextAc="seek">
-              <p:cTn id="2" dur="indefinite" nodeType="mainSeq">
-                <p:childTnLst>
-                  <p:par>
-                    <p:cTn id="3" fill="hold">
-                      <p:stCondLst>
-                        <p:cond delay="indefinite"/>
-                      </p:stCondLst>
-                      <p:childTnLst>
-                        <p:par>
-                          <p:cTn id="4" fill="hold">
-                            <p:stCondLst>
-                              <p:cond delay="0"/>
-                            </p:stCondLst>
-                            <p:childTnLst>
-                              <p:par>
-                                <p:cTn id="5" presetID="1" presetClass="mediacall" presetSubtype="0" fill="hold" nodeType="clickEffect">
-                                  <p:stCondLst>
-                                    <p:cond delay="0"/>
-                                  </p:stCondLst>
-                                  <p:childTnLst>
-                                    <p:cmd type="call" cmd="playFrom(0.0)">
-                                      <p:cBhvr>
-                                        <p:cTn id="6" dur="1" fill="hold"/>
-                                        <p:tgtEl>
-                                          <p:spTgt spid="4"/>
-                                        </p:tgtEl>
-                                      </p:cBhvr>
-                                    </p:cmd>
-                                  </p:childTnLst>
-                                </p:cTn>
-                              </p:par>
-                            </p:childTnLst>
-                          </p:cTn>
-                        </p:par>
-                      </p:childTnLst>
-                    </p:cTn>
-                  </p:par>
-                </p:childTnLst>
-              </p:cTn>
-              <p:prevCondLst>
-                <p:cond evt="onPrev" delay="0">
-                  <p:tgtEl>
-                    <p:sldTgt/>
-                  </p:tgtEl>
-                </p:cond>
-              </p:prevCondLst>
-              <p:nextCondLst>
-                <p:cond evt="onNext" delay="0">
-                  <p:tgtEl>
-                    <p:sldTgt/>
-                  </p:tgtEl>
-                </p:cond>
-              </p:nextCondLst>
-            </p:seq>
-            <p:video>
-              <p:cMediaNode vol="80000">
-                <p:cTn id="7" fill="hold" display="0">
-                  <p:stCondLst>
-                    <p:cond delay="indefinite"/>
-                  </p:stCondLst>
-                </p:cTn>
-                <p:tgtEl>
-                  <p:spTgt spid="4"/>
-                </p:tgtEl>
-              </p:cMediaNode>
-            </p:video>
-            <p:seq concurrent="1" nextAc="seek">
-              <p:cTn id="8" restart="whenNotActive" fill="hold" evtFilter="cancelBubble" nodeType="interactiveSeq">
-                <p:stCondLst>
-                  <p:cond evt="onClick" delay="0">
-                    <p:tgtEl>
-                      <p:spTgt spid="4"/>
-                    </p:tgtEl>
-                  </p:cond>
-                </p:stCondLst>
-                <p:endSync evt="end" delay="0">
-                  <p:rtn val="all"/>
-                </p:endSync>
-                <p:childTnLst>
-                  <p:par>
-                    <p:cTn id="9" fill="hold">
-                      <p:stCondLst>
-                        <p:cond delay="0"/>
-                      </p:stCondLst>
-                      <p:childTnLst>
-                        <p:par>
-                          <p:cTn id="10" fill="hold">
-                            <p:stCondLst>
-                              <p:cond delay="0"/>
-                            </p:stCondLst>
-                            <p:childTnLst>
-                              <p:par>
-                                <p:cTn id="11" presetID="2" presetClass="mediacall" presetSubtype="0" fill="hold" nodeType="clickEffect">
-                                  <p:stCondLst>
-                                    <p:cond delay="0"/>
-                                  </p:stCondLst>
-                                  <p:childTnLst>
-                                    <p:cmd type="call" cmd="togglePause">
-                                      <p:cBhvr>
-                                        <p:cTn id="12" dur="1" fill="hold"/>
-                                        <p:tgtEl>
-                                          <p:spTgt spid="4"/>
-                                        </p:tgtEl>
-                                      </p:cBhvr>
-                                    </p:cmd>
-                                  </p:childTnLst>
-                                </p:cTn>
-                              </p:par>
-                            </p:childTnLst>
-                          </p:cTn>
-                        </p:par>
-                      </p:childTnLst>
-                    </p:cTn>
-                  </p:par>
-                </p:childTnLst>
-              </p:cTn>
-              <p:nextCondLst>
-                <p:cond evt="onClick" delay="0">
-                  <p:tgtEl>
-                    <p:spTgt spid="4"/>
-                  </p:tgtEl>
-                </p:cond>
-              </p:nextCondLst>
-            </p:seq>
-          </p:childTnLst>
-        </p:cTn>
-      </p:par>
-    </p:tnLst>
-  </p:timing>
-</p:sld>
-</file>
-
 <file path=ppt/slides/slide2.xml><?xml version="1.0" encoding="utf-8"?>
 <p:sld xmlns:a="http://schemas.openxmlformats.org/drawingml/2006/main" xmlns:r="http://schemas.openxmlformats.org/officeDocument/2006/relationships" xmlns:p="http://schemas.openxmlformats.org/presentationml/2006/main">
   <p:cSld>
@@ -5888,69 +5052,9 @@
         </p:spPr>
         <p:txBody>
           <a:bodyPr anchor="ctr">
-            <a:normAutofit fontScale="92500" lnSpcReduction="10000"/>
+            <a:normAutofit/>
           </a:bodyPr>
           <a:lstStyle/>
-          <a:p>
-            <a:r>
-              <a:rPr lang="nl-BE" sz="1800" dirty="0">
-                <a:solidFill>
-                  <a:srgbClr val="000000"/>
-                </a:solidFill>
-              </a:rPr>
-              <a:t>Maak klasse Held met </a:t>
-            </a:r>
-          </a:p>
-          <a:p>
-            <a:pPr lvl="1"/>
-            <a:r>
-              <a:rPr lang="nl-BE" sz="1800">
-                <a:solidFill>
-                  <a:srgbClr val="000000"/>
-                </a:solidFill>
-              </a:rPr>
-              <a:t>Autoproperties</a:t>
-            </a:r>
-            <a:endParaRPr lang="nl-BE" sz="1800" dirty="0">
-              <a:solidFill>
-                <a:srgbClr val="000000"/>
-              </a:solidFill>
-            </a:endParaRPr>
-          </a:p>
-          <a:p>
-            <a:pPr lvl="1"/>
-            <a:r>
-              <a:rPr lang="nl-BE" sz="1800" dirty="0" err="1">
-                <a:solidFill>
-                  <a:srgbClr val="000000"/>
-                </a:solidFill>
-              </a:rPr>
-              <a:t>Constructor</a:t>
-            </a:r>
-            <a:endParaRPr lang="nl-BE" sz="1800" dirty="0">
-              <a:solidFill>
-                <a:srgbClr val="000000"/>
-              </a:solidFill>
-            </a:endParaRPr>
-          </a:p>
-          <a:p>
-            <a:pPr lvl="1"/>
-            <a:endParaRPr lang="nl-BE" sz="1800" dirty="0">
-              <a:solidFill>
-                <a:srgbClr val="000000"/>
-              </a:solidFill>
-            </a:endParaRPr>
-          </a:p>
-          <a:p>
-            <a:r>
-              <a:rPr lang="nl-BE" sz="2200" dirty="0">
-                <a:solidFill>
-                  <a:srgbClr val="000000"/>
-                </a:solidFill>
-              </a:rPr>
-              <a:t>Test door 4 objecten aan te maken</a:t>
-            </a:r>
-          </a:p>
           <a:p>
             <a:endParaRPr lang="nl-BE" sz="1800" dirty="0">
               <a:solidFill>
@@ -5990,543 +5094,124 @@
           <a:chExt cx="0" cy="0"/>
         </a:xfrm>
       </p:grpSpPr>
-      <p:pic>
-        <p:nvPicPr>
-          <p:cNvPr id="3076" name="Picture 4" descr="Afbeeldingsresultaat voor collage history popculture">
-            <a:extLst>
-              <a:ext uri="{FF2B5EF4-FFF2-40B4-BE49-F238E27FC236}">
-                <a16:creationId xmlns:a16="http://schemas.microsoft.com/office/drawing/2014/main" id="{435B4F00-51EE-46B0-90F9-F1F0D354850E}"/>
-              </a:ext>
-            </a:extLst>
-          </p:cNvPr>
-          <p:cNvPicPr>
-            <a:picLocks noChangeAspect="1" noChangeArrowheads="1"/>
-          </p:cNvPicPr>
-          <p:nvPr/>
-        </p:nvPicPr>
-        <p:blipFill>
-          <a:blip r:embed="rId4">
-            <a:extLst>
-              <a:ext uri="{BEBA8EAE-BF5A-486C-A8C5-ECC9F3942E4B}">
-                <a14:imgProps xmlns:a14="http://schemas.microsoft.com/office/drawing/2010/main">
-                  <a14:imgLayer r:embed="rId5">
-                    <a14:imgEffect>
-                      <a14:saturation sat="33000"/>
-                    </a14:imgEffect>
-                    <a14:imgEffect>
-                      <a14:brightnessContrast bright="-20000" contrast="-20000"/>
-                    </a14:imgEffect>
-                  </a14:imgLayer>
-                </a14:imgProps>
-              </a:ext>
-              <a:ext uri="{28A0092B-C50C-407E-A947-70E740481C1C}">
-                <a14:useLocalDpi xmlns:a14="http://schemas.microsoft.com/office/drawing/2010/main" val="0"/>
-              </a:ext>
-            </a:extLst>
-          </a:blip>
-          <a:srcRect/>
-          <a:stretch>
-            <a:fillRect/>
-          </a:stretch>
-        </p:blipFill>
-        <p:spPr bwMode="auto">
-          <a:xfrm>
-            <a:off x="46609" y="-129396"/>
-            <a:ext cx="12145391" cy="6992287"/>
-          </a:xfrm>
-          <a:prstGeom prst="rect">
-            <a:avLst/>
-          </a:prstGeom>
-          <a:noFill/>
-          <a:extLst>
-            <a:ext uri="{909E8E84-426E-40DD-AFC4-6F175D3DCCD1}">
-              <a14:hiddenFill xmlns:a14="http://schemas.microsoft.com/office/drawing/2010/main">
-                <a:solidFill>
-                  <a:srgbClr val="FFFFFF"/>
-                </a:solidFill>
-              </a14:hiddenFill>
-            </a:ext>
-          </a:extLst>
-        </p:spPr>
-      </p:pic>
-      <p:sp>
-        <p:nvSpPr>
-          <p:cNvPr id="6" name="Tekstvak 5">
-            <a:extLst>
-              <a:ext uri="{FF2B5EF4-FFF2-40B4-BE49-F238E27FC236}">
-                <a16:creationId xmlns:a16="http://schemas.microsoft.com/office/drawing/2014/main" id="{A1D15729-6C44-4942-A3D6-5BE49AE83BE6}"/>
-              </a:ext>
-            </a:extLst>
-          </p:cNvPr>
-          <p:cNvSpPr txBox="1"/>
-          <p:nvPr/>
-        </p:nvSpPr>
-        <p:spPr>
-          <a:xfrm>
-            <a:off x="3160444" y="5414526"/>
-            <a:ext cx="5917720" cy="830997"/>
-          </a:xfrm>
-          <a:prstGeom prst="rect">
-            <a:avLst/>
-          </a:prstGeom>
-          <a:noFill/>
-        </p:spPr>
-        <p:txBody>
-          <a:bodyPr wrap="square" rtlCol="0">
-            <a:spAutoFit/>
-          </a:bodyPr>
-          <a:lstStyle/>
-          <a:p>
-            <a:r>
-              <a:rPr lang="nl-BE" sz="4800" dirty="0">
-                <a:solidFill>
-                  <a:schemeClr val="bg1"/>
-                </a:solidFill>
-                <a:latin typeface="Alien Encounters" panose="00000400000000000000" pitchFamily="2" charset="0"/>
-              </a:rPr>
-              <a:t>Cultuur met Tim</a:t>
-            </a:r>
-          </a:p>
-        </p:txBody>
-      </p:sp>
-      <p:pic>
-        <p:nvPicPr>
-          <p:cNvPr id="3074" name="Picture 2" descr="Afbeeldingsresultaat voor globe">
-            <a:extLst>
-              <a:ext uri="{FF2B5EF4-FFF2-40B4-BE49-F238E27FC236}">
-                <a16:creationId xmlns:a16="http://schemas.microsoft.com/office/drawing/2014/main" id="{740449C8-9EEC-4CFF-9F06-CF5F20B2D022}"/>
-              </a:ext>
-            </a:extLst>
-          </p:cNvPr>
-          <p:cNvPicPr>
-            <a:picLocks noChangeAspect="1" noChangeArrowheads="1"/>
-          </p:cNvPicPr>
-          <p:nvPr/>
-        </p:nvPicPr>
-        <p:blipFill>
-          <a:blip r:embed="rId6">
-            <a:clrChange>
-              <a:clrFrom>
-                <a:srgbClr val="FFFFFF"/>
-              </a:clrFrom>
-              <a:clrTo>
-                <a:srgbClr val="FFFFFF">
-                  <a:alpha val="0"/>
-                </a:srgbClr>
-              </a:clrTo>
-            </a:clrChange>
-            <a:extLst>
-              <a:ext uri="{28A0092B-C50C-407E-A947-70E740481C1C}">
-                <a14:useLocalDpi xmlns:a14="http://schemas.microsoft.com/office/drawing/2010/main" val="0"/>
-              </a:ext>
-            </a:extLst>
-          </a:blip>
-          <a:srcRect/>
-          <a:stretch>
-            <a:fillRect/>
-          </a:stretch>
-        </p:blipFill>
-        <p:spPr bwMode="auto">
-          <a:xfrm>
-            <a:off x="3856614" y="629728"/>
-            <a:ext cx="3940661" cy="4865298"/>
-          </a:xfrm>
-          <a:prstGeom prst="rect">
-            <a:avLst/>
-          </a:prstGeom>
-          <a:noFill/>
-          <a:extLst>
-            <a:ext uri="{909E8E84-426E-40DD-AFC4-6F175D3DCCD1}">
-              <a14:hiddenFill xmlns:a14="http://schemas.microsoft.com/office/drawing/2010/main">
-                <a:solidFill>
-                  <a:srgbClr val="FFFFFF"/>
-                </a:solidFill>
-              </a14:hiddenFill>
-            </a:ext>
-          </a:extLst>
-        </p:spPr>
-      </p:pic>
-      <p:pic>
-        <p:nvPicPr>
-          <p:cNvPr id="4" name="Afbeelding 3">
-            <a:extLst>
-              <a:ext uri="{FF2B5EF4-FFF2-40B4-BE49-F238E27FC236}">
-                <a16:creationId xmlns:a16="http://schemas.microsoft.com/office/drawing/2014/main" id="{39F0EB30-BF70-4B58-AE5A-4DAEC1474FC8}"/>
-              </a:ext>
-            </a:extLst>
-          </p:cNvPr>
-          <p:cNvPicPr>
-            <a:picLocks noChangeAspect="1"/>
-          </p:cNvPicPr>
-          <p:nvPr/>
-        </p:nvPicPr>
-        <p:blipFill rotWithShape="1">
-          <a:blip r:embed="rId7">
-            <a:alphaModFix/>
-          </a:blip>
-          <a:srcRect t="25481" r="-2" b="16828"/>
-          <a:stretch/>
-        </p:blipFill>
-        <p:spPr>
-          <a:xfrm>
-            <a:off x="3856007" y="1449841"/>
-            <a:ext cx="3767662" cy="2191740"/>
-          </a:xfrm>
-          <a:prstGeom prst="rect">
-            <a:avLst/>
-          </a:prstGeom>
-          <a:effectLst>
-            <a:softEdge rad="533400"/>
-          </a:effectLst>
-        </p:spPr>
-      </p:pic>
-      <p:pic>
-        <p:nvPicPr>
-          <p:cNvPr id="8" name="good_bad_ugly">
-            <a:hlinkClick r:id="" action="ppaction://media"/>
-            <a:extLst>
-              <a:ext uri="{FF2B5EF4-FFF2-40B4-BE49-F238E27FC236}">
-                <a16:creationId xmlns:a16="http://schemas.microsoft.com/office/drawing/2014/main" id="{A6D98FC2-5A27-4128-A53C-054BA7490008}"/>
-              </a:ext>
-            </a:extLst>
-          </p:cNvPr>
-          <p:cNvPicPr>
-            <a:picLocks noChangeAspect="1"/>
-          </p:cNvPicPr>
-          <p:nvPr>
-            <a:audioFile r:link="rId2"/>
-            <p:extLst>
-              <p:ext uri="{DAA4B4D4-6D71-4841-9C94-3DE7FCFB9230}">
-                <p14:media xmlns:p14="http://schemas.microsoft.com/office/powerpoint/2010/main" r:embed="rId1"/>
-              </p:ext>
-            </p:extLst>
-          </p:nvPr>
-        </p:nvPicPr>
-        <p:blipFill>
-          <a:blip r:embed="rId8"/>
-          <a:stretch>
-            <a:fillRect/>
-          </a:stretch>
-        </p:blipFill>
-        <p:spPr>
-          <a:xfrm>
-            <a:off x="5791200" y="3124200"/>
-            <a:ext cx="609600" cy="609600"/>
-          </a:xfrm>
-          <a:prstGeom prst="rect">
-            <a:avLst/>
-          </a:prstGeom>
-        </p:spPr>
-      </p:pic>
+      <p:sp>
+        <p:nvSpPr>
+          <p:cNvPr id="2" name="Titel 1">
+            <a:extLst>
+              <a:ext uri="{FF2B5EF4-FFF2-40B4-BE49-F238E27FC236}">
+                <a16:creationId xmlns:a16="http://schemas.microsoft.com/office/drawing/2014/main" id="{E0ED6EBC-7825-412E-BA95-087E497F7399}"/>
+              </a:ext>
+            </a:extLst>
+          </p:cNvPr>
+          <p:cNvSpPr>
+            <a:spLocks noGrp="1"/>
+          </p:cNvSpPr>
+          <p:nvPr>
+            <p:ph type="title"/>
+          </p:nvPr>
+        </p:nvSpPr>
+        <p:spPr/>
+        <p:txBody>
+          <a:bodyPr/>
+          <a:lstStyle/>
+          <a:p>
+            <a:r>
+              <a:rPr lang="nl-BE" dirty="0"/>
+              <a:t>Wat we gaan maken vandaag</a:t>
+            </a:r>
+          </a:p>
+        </p:txBody>
+      </p:sp>
+      <p:sp>
+        <p:nvSpPr>
+          <p:cNvPr id="3" name="Tijdelijke aanduiding voor inhoud 2">
+            <a:extLst>
+              <a:ext uri="{FF2B5EF4-FFF2-40B4-BE49-F238E27FC236}">
+                <a16:creationId xmlns:a16="http://schemas.microsoft.com/office/drawing/2014/main" id="{52C4DCF1-739E-41E4-B4B4-8AF362B1BE40}"/>
+              </a:ext>
+            </a:extLst>
+          </p:cNvPr>
+          <p:cNvSpPr>
+            <a:spLocks noGrp="1"/>
+          </p:cNvSpPr>
+          <p:nvPr>
+            <p:ph idx="1"/>
+          </p:nvPr>
+        </p:nvSpPr>
+        <p:spPr/>
+        <p:txBody>
+          <a:bodyPr/>
+          <a:lstStyle/>
+          <a:p>
+            <a:r>
+              <a:rPr lang="nl-BE" dirty="0"/>
+              <a:t>Klasse helden</a:t>
+            </a:r>
+          </a:p>
+          <a:p>
+            <a:pPr lvl="1"/>
+            <a:r>
+              <a:rPr lang="nl-BE" dirty="0" err="1"/>
+              <a:t>Properties</a:t>
+            </a:r>
+            <a:endParaRPr lang="nl-BE" dirty="0"/>
+          </a:p>
+          <a:p>
+            <a:pPr lvl="1"/>
+            <a:r>
+              <a:rPr lang="nl-BE" dirty="0" err="1"/>
+              <a:t>Constructor</a:t>
+            </a:r>
+            <a:endParaRPr lang="nl-BE" dirty="0"/>
+          </a:p>
+          <a:p>
+            <a:pPr lvl="1"/>
+            <a:r>
+              <a:rPr lang="nl-BE" dirty="0" err="1"/>
+              <a:t>Enum</a:t>
+            </a:r>
+            <a:r>
+              <a:rPr lang="nl-BE" dirty="0"/>
+              <a:t> om heldtype te bepalen</a:t>
+            </a:r>
+          </a:p>
+          <a:p>
+            <a:pPr lvl="1"/>
+            <a:r>
+              <a:rPr lang="nl-BE" dirty="0"/>
+              <a:t>Beschrijvingen uit “resource” bestand uitlezen</a:t>
+            </a:r>
+          </a:p>
+          <a:p>
+            <a:pPr lvl="1"/>
+            <a:r>
+              <a:rPr lang="nl-BE" dirty="0"/>
+              <a:t>Methode om “fiche” van held te tonen</a:t>
+            </a:r>
+          </a:p>
+          <a:p>
+            <a:pPr lvl="1"/>
+            <a:endParaRPr lang="nl-BE" dirty="0"/>
+          </a:p>
+          <a:p>
+            <a:r>
+              <a:rPr lang="nl-BE"/>
+              <a:t>Klasse testen</a:t>
+            </a:r>
+            <a:endParaRPr lang="nl-BE" dirty="0"/>
+          </a:p>
+        </p:txBody>
+      </p:sp>
     </p:spTree>
     <p:extLst>
       <p:ext uri="{BB962C8B-B14F-4D97-AF65-F5344CB8AC3E}">
-        <p14:creationId xmlns:p14="http://schemas.microsoft.com/office/powerpoint/2010/main" val="955296321"/>
+        <p14:creationId xmlns:p14="http://schemas.microsoft.com/office/powerpoint/2010/main" val="1187596639"/>
       </p:ext>
     </p:extLst>
   </p:cSld>
   <p:clrMapOvr>
     <a:masterClrMapping/>
   </p:clrMapOvr>
-  <mc:AlternateContent xmlns:mc="http://schemas.openxmlformats.org/markup-compatibility/2006" xmlns:p15="http://schemas.microsoft.com/office/powerpoint/2012/main">
-    <mc:Choice Requires="p15">
-      <p:transition xmlns:p14="http://schemas.microsoft.com/office/powerpoint/2010/main" spd="slow" p14:dur="4000">
-        <p15:prstTrans prst="curtains"/>
-      </p:transition>
-    </mc:Choice>
-    <mc:Fallback xmlns="">
-      <p:transition spd="slow">
-        <p:fade/>
-      </p:transition>
-    </mc:Fallback>
-  </mc:AlternateContent>
-  <p:timing>
-    <p:tnLst>
-      <p:par>
-        <p:cTn id="1" dur="indefinite" restart="never" nodeType="tmRoot">
-          <p:childTnLst>
-            <p:seq concurrent="1" nextAc="seek">
-              <p:cTn id="2" dur="indefinite" nodeType="mainSeq">
-                <p:childTnLst>
-                  <p:par>
-                    <p:cTn id="3" fill="hold">
-                      <p:stCondLst>
-                        <p:cond delay="indefinite"/>
-                        <p:cond evt="onBegin" delay="0">
-                          <p:tn val="2"/>
-                        </p:cond>
-                      </p:stCondLst>
-                      <p:childTnLst>
-                        <p:par>
-                          <p:cTn id="4" fill="hold">
-                            <p:stCondLst>
-                              <p:cond delay="0"/>
-                            </p:stCondLst>
-                            <p:childTnLst>
-                              <p:par>
-                                <p:cTn id="5" presetID="1" presetClass="mediacall" presetSubtype="0" fill="hold" nodeType="afterEffect">
-                                  <p:stCondLst>
-                                    <p:cond delay="0"/>
-                                  </p:stCondLst>
-                                  <p:childTnLst>
-                                    <p:cmd type="call" cmd="playFrom(0.0)">
-                                      <p:cBhvr>
-                                        <p:cTn id="6" dur="8736" fill="hold"/>
-                                        <p:tgtEl>
-                                          <p:spTgt spid="8"/>
-                                        </p:tgtEl>
-                                      </p:cBhvr>
-                                    </p:cmd>
-                                  </p:childTnLst>
-                                </p:cTn>
-                              </p:par>
-                              <p:par>
-                                <p:cTn id="7" presetID="45" presetClass="entr" presetSubtype="0" fill="hold" nodeType="withEffect">
-                                  <p:stCondLst>
-                                    <p:cond delay="0"/>
-                                  </p:stCondLst>
-                                  <p:childTnLst>
-                                    <p:set>
-                                      <p:cBhvr>
-                                        <p:cTn id="8" dur="1" fill="hold">
-                                          <p:stCondLst>
-                                            <p:cond delay="0"/>
-                                          </p:stCondLst>
-                                        </p:cTn>
-                                        <p:tgtEl>
-                                          <p:spTgt spid="3074"/>
-                                        </p:tgtEl>
-                                        <p:attrNameLst>
-                                          <p:attrName>style.visibility</p:attrName>
-                                        </p:attrNameLst>
-                                      </p:cBhvr>
-                                      <p:to>
-                                        <p:strVal val="visible"/>
-                                      </p:to>
-                                    </p:set>
-                                    <p:animEffect transition="in" filter="fade">
-                                      <p:cBhvr>
-                                        <p:cTn id="9" dur="2000"/>
-                                        <p:tgtEl>
-                                          <p:spTgt spid="3074"/>
-                                        </p:tgtEl>
-                                      </p:cBhvr>
-                                    </p:animEffect>
-                                    <p:anim calcmode="lin" valueType="num">
-                                      <p:cBhvr>
-                                        <p:cTn id="10" dur="2000" fill="hold"/>
-                                        <p:tgtEl>
-                                          <p:spTgt spid="3074"/>
-                                        </p:tgtEl>
-                                        <p:attrNameLst>
-                                          <p:attrName>ppt_w</p:attrName>
-                                        </p:attrNameLst>
-                                      </p:cBhvr>
-                                      <p:tavLst>
-                                        <p:tav tm="0" fmla="#ppt_w*sin(2.5*pi*$)">
-                                          <p:val>
-                                            <p:fltVal val="0"/>
-                                          </p:val>
-                                        </p:tav>
-                                        <p:tav tm="100000">
-                                          <p:val>
-                                            <p:fltVal val="1"/>
-                                          </p:val>
-                                        </p:tav>
-                                      </p:tavLst>
-                                    </p:anim>
-                                    <p:anim calcmode="lin" valueType="num">
-                                      <p:cBhvr>
-                                        <p:cTn id="11" dur="2000" fill="hold"/>
-                                        <p:tgtEl>
-                                          <p:spTgt spid="3074"/>
-                                        </p:tgtEl>
-                                        <p:attrNameLst>
-                                          <p:attrName>ppt_h</p:attrName>
-                                        </p:attrNameLst>
-                                      </p:cBhvr>
-                                      <p:tavLst>
-                                        <p:tav tm="0">
-                                          <p:val>
-                                            <p:strVal val="#ppt_h"/>
-                                          </p:val>
-                                        </p:tav>
-                                        <p:tav tm="100000">
-                                          <p:val>
-                                            <p:strVal val="#ppt_h"/>
-                                          </p:val>
-                                        </p:tav>
-                                      </p:tavLst>
-                                    </p:anim>
-                                  </p:childTnLst>
-                                </p:cTn>
-                              </p:par>
-                              <p:par>
-                                <p:cTn id="12" presetID="53" presetClass="entr" presetSubtype="16" fill="hold" nodeType="withEffect">
-                                  <p:stCondLst>
-                                    <p:cond delay="2000"/>
-                                  </p:stCondLst>
-                                  <p:childTnLst>
-                                    <p:set>
-                                      <p:cBhvr>
-                                        <p:cTn id="13" dur="1" fill="hold">
-                                          <p:stCondLst>
-                                            <p:cond delay="0"/>
-                                          </p:stCondLst>
-                                        </p:cTn>
-                                        <p:tgtEl>
-                                          <p:spTgt spid="4"/>
-                                        </p:tgtEl>
-                                        <p:attrNameLst>
-                                          <p:attrName>style.visibility</p:attrName>
-                                        </p:attrNameLst>
-                                      </p:cBhvr>
-                                      <p:to>
-                                        <p:strVal val="visible"/>
-                                      </p:to>
-                                    </p:set>
-                                    <p:anim calcmode="lin" valueType="num">
-                                      <p:cBhvr>
-                                        <p:cTn id="14" dur="2000" fill="hold"/>
-                                        <p:tgtEl>
-                                          <p:spTgt spid="4"/>
-                                        </p:tgtEl>
-                                        <p:attrNameLst>
-                                          <p:attrName>ppt_w</p:attrName>
-                                        </p:attrNameLst>
-                                      </p:cBhvr>
-                                      <p:tavLst>
-                                        <p:tav tm="0">
-                                          <p:val>
-                                            <p:fltVal val="0"/>
-                                          </p:val>
-                                        </p:tav>
-                                        <p:tav tm="100000">
-                                          <p:val>
-                                            <p:strVal val="#ppt_w"/>
-                                          </p:val>
-                                        </p:tav>
-                                      </p:tavLst>
-                                    </p:anim>
-                                    <p:anim calcmode="lin" valueType="num">
-                                      <p:cBhvr>
-                                        <p:cTn id="15" dur="2000" fill="hold"/>
-                                        <p:tgtEl>
-                                          <p:spTgt spid="4"/>
-                                        </p:tgtEl>
-                                        <p:attrNameLst>
-                                          <p:attrName>ppt_h</p:attrName>
-                                        </p:attrNameLst>
-                                      </p:cBhvr>
-                                      <p:tavLst>
-                                        <p:tav tm="0">
-                                          <p:val>
-                                            <p:fltVal val="0"/>
-                                          </p:val>
-                                        </p:tav>
-                                        <p:tav tm="100000">
-                                          <p:val>
-                                            <p:strVal val="#ppt_h"/>
-                                          </p:val>
-                                        </p:tav>
-                                      </p:tavLst>
-                                    </p:anim>
-                                    <p:animEffect transition="in" filter="fade">
-                                      <p:cBhvr>
-                                        <p:cTn id="16" dur="2000"/>
-                                        <p:tgtEl>
-                                          <p:spTgt spid="4"/>
-                                        </p:tgtEl>
-                                      </p:cBhvr>
-                                    </p:animEffect>
-                                  </p:childTnLst>
-                                </p:cTn>
-                              </p:par>
-                              <p:par>
-                                <p:cTn id="17" presetID="14" presetClass="entr" presetSubtype="10" fill="hold" grpId="0" nodeType="withEffect">
-                                  <p:stCondLst>
-                                    <p:cond delay="2000"/>
-                                  </p:stCondLst>
-                                  <p:childTnLst>
-                                    <p:set>
-                                      <p:cBhvr>
-                                        <p:cTn id="18" dur="1" fill="hold">
-                                          <p:stCondLst>
-                                            <p:cond delay="0"/>
-                                          </p:stCondLst>
-                                        </p:cTn>
-                                        <p:tgtEl>
-                                          <p:spTgt spid="6"/>
-                                        </p:tgtEl>
-                                        <p:attrNameLst>
-                                          <p:attrName>style.visibility</p:attrName>
-                                        </p:attrNameLst>
-                                      </p:cBhvr>
-                                      <p:to>
-                                        <p:strVal val="visible"/>
-                                      </p:to>
-                                    </p:set>
-                                    <p:animEffect transition="in" filter="randombar(horizontal)">
-                                      <p:cBhvr>
-                                        <p:cTn id="19" dur="1250"/>
-                                        <p:tgtEl>
-                                          <p:spTgt spid="6"/>
-                                        </p:tgtEl>
-                                      </p:cBhvr>
-                                    </p:animEffect>
-                                  </p:childTnLst>
-                                </p:cTn>
-                              </p:par>
-                            </p:childTnLst>
-                          </p:cTn>
-                        </p:par>
-                      </p:childTnLst>
-                    </p:cTn>
-                  </p:par>
-                </p:childTnLst>
-              </p:cTn>
-              <p:prevCondLst>
-                <p:cond evt="onPrev" delay="0">
-                  <p:tgtEl>
-                    <p:sldTgt/>
-                  </p:tgtEl>
-                </p:cond>
-              </p:prevCondLst>
-              <p:nextCondLst>
-                <p:cond evt="onNext" delay="0">
-                  <p:tgtEl>
-                    <p:sldTgt/>
-                  </p:tgtEl>
-                </p:cond>
-              </p:nextCondLst>
-            </p:seq>
-            <p:audio>
-              <p:cMediaNode vol="80000" showWhenStopped="0">
-                <p:cTn id="20" fill="hold" display="0">
-                  <p:stCondLst>
-                    <p:cond delay="indefinite"/>
-                  </p:stCondLst>
-                  <p:endCondLst>
-                    <p:cond evt="onStopAudio" delay="0">
-                      <p:tgtEl>
-                        <p:sldTgt/>
-                      </p:tgtEl>
-                    </p:cond>
-                  </p:endCondLst>
-                </p:cTn>
-                <p:tgtEl>
-                  <p:spTgt spid="8"/>
-                </p:tgtEl>
-              </p:cMediaNode>
-            </p:audio>
-          </p:childTnLst>
-        </p:cTn>
-      </p:par>
-    </p:tnLst>
-    <p:bldLst>
-      <p:bldP spid="6" grpId="0"/>
-    </p:bldLst>
-  </p:timing>
 </p:sld>
 </file>
 

</xml_diff>

<commit_message>
github link in slide toegevoegd
</commit_message>
<xml_diff>
--- a/slides/les1_heroopquest.pptx
+++ b/slides/les1_heroopquest.pptx
@@ -11,10 +11,11 @@
     <p:sldId id="262" r:id="rId5"/>
     <p:sldId id="263" r:id="rId6"/>
     <p:sldId id="259" r:id="rId7"/>
-    <p:sldId id="258" r:id="rId8"/>
-    <p:sldId id="260" r:id="rId9"/>
-    <p:sldId id="261" r:id="rId10"/>
-    <p:sldId id="264" r:id="rId11"/>
+    <p:sldId id="266" r:id="rId8"/>
+    <p:sldId id="258" r:id="rId9"/>
+    <p:sldId id="260" r:id="rId10"/>
+    <p:sldId id="261" r:id="rId11"/>
+    <p:sldId id="264" r:id="rId12"/>
   </p:sldIdLst>
   <p:sldSz cx="12192000" cy="6858000"/>
   <p:notesSz cx="6858000" cy="9144000"/>
@@ -3710,6 +3711,272 @@
 <file path=ppt/slides/slide10.xml><?xml version="1.0" encoding="utf-8"?>
 <p:sld xmlns:a="http://schemas.openxmlformats.org/drawingml/2006/main" xmlns:r="http://schemas.openxmlformats.org/officeDocument/2006/relationships" xmlns:p="http://schemas.openxmlformats.org/presentationml/2006/main">
   <p:cSld>
+    <p:bg>
+      <p:bgPr>
+        <a:solidFill>
+          <a:schemeClr val="bg1"/>
+        </a:solidFill>
+        <a:effectLst/>
+      </p:bgPr>
+    </p:bg>
+    <p:spTree>
+      <p:nvGrpSpPr>
+        <p:cNvPr id="1" name=""/>
+        <p:cNvGrpSpPr/>
+        <p:nvPr/>
+      </p:nvGrpSpPr>
+      <p:grpSpPr>
+        <a:xfrm>
+          <a:off x="0" y="0"/>
+          <a:ext cx="0" cy="0"/>
+          <a:chOff x="0" y="0"/>
+          <a:chExt cx="0" cy="0"/>
+        </a:xfrm>
+      </p:grpSpPr>
+      <p:pic>
+        <p:nvPicPr>
+          <p:cNvPr id="4" name="Picture 2" descr="Afbeeldingsresultaat voor heroquest hleden">
+            <a:extLst>
+              <a:ext uri="{FF2B5EF4-FFF2-40B4-BE49-F238E27FC236}">
+                <a16:creationId xmlns:a16="http://schemas.microsoft.com/office/drawing/2014/main" id="{612118AA-A92F-4A82-8712-BC68F992E42A}"/>
+              </a:ext>
+            </a:extLst>
+          </p:cNvPr>
+          <p:cNvPicPr>
+            <a:picLocks noChangeAspect="1" noChangeArrowheads="1"/>
+          </p:cNvPicPr>
+          <p:nvPr/>
+        </p:nvPicPr>
+        <p:blipFill rotWithShape="1">
+          <a:blip r:embed="rId2">
+            <a:extLst>
+              <a:ext uri="{28A0092B-C50C-407E-A947-70E740481C1C}">
+                <a14:useLocalDpi xmlns:a14="http://schemas.microsoft.com/office/drawing/2010/main" val="0"/>
+              </a:ext>
+            </a:extLst>
+          </a:blip>
+          <a:srcRect l="1300" r="5306"/>
+          <a:stretch/>
+        </p:blipFill>
+        <p:spPr bwMode="auto">
+          <a:xfrm>
+            <a:off x="-1" y="-197258"/>
+            <a:ext cx="12192001" cy="4666928"/>
+          </a:xfrm>
+          <a:prstGeom prst="rect">
+            <a:avLst/>
+          </a:prstGeom>
+          <a:noFill/>
+          <a:extLst>
+            <a:ext uri="{909E8E84-426E-40DD-AFC4-6F175D3DCCD1}">
+              <a14:hiddenFill xmlns:a14="http://schemas.microsoft.com/office/drawing/2010/main">
+                <a:solidFill>
+                  <a:srgbClr val="FFFFFF"/>
+                </a:solidFill>
+              </a14:hiddenFill>
+            </a:ext>
+          </a:extLst>
+        </p:spPr>
+      </p:pic>
+      <p:pic>
+        <p:nvPicPr>
+          <p:cNvPr id="10" name="Picture 9">
+            <a:extLst>
+              <a:ext uri="{FF2B5EF4-FFF2-40B4-BE49-F238E27FC236}">
+                <a16:creationId xmlns:a16="http://schemas.microsoft.com/office/drawing/2014/main" id="{EE09A529-E47C-4634-BB98-0A9526C372B4}"/>
+              </a:ext>
+              <a:ext uri="{C183D7F6-B498-43B3-948B-1728B52AA6E4}">
+                <adec:decorative xmlns:adec="http://schemas.microsoft.com/office/drawing/2017/decorative" val="1"/>
+              </a:ext>
+            </a:extLst>
+          </p:cNvPr>
+          <p:cNvPicPr>
+            <a:picLocks noGrp="1" noRot="1" noChangeAspect="1" noMove="1" noResize="1" noEditPoints="1" noAdjustHandles="1" noChangeArrowheads="1" noChangeShapeType="1" noCrop="1"/>
+          </p:cNvPicPr>
+          <p:nvPr>
+            <p:extLst>
+              <p:ext uri="{386F3935-93C4-4BCD-93E2-E3B085C9AB24}">
+                <p16:designElem xmlns:p16="http://schemas.microsoft.com/office/powerpoint/2015/main" val="1"/>
+              </p:ext>
+            </p:extLst>
+          </p:nvPr>
+        </p:nvPicPr>
+        <p:blipFill>
+          <a:blip r:embed="rId3">
+            <a:extLst>
+              <a:ext uri="{28A0092B-C50C-407E-A947-70E740481C1C}">
+                <a14:useLocalDpi xmlns:a14="http://schemas.microsoft.com/office/drawing/2010/main" val="0"/>
+              </a:ext>
+            </a:extLst>
+          </a:blip>
+          <a:stretch>
+            <a:fillRect/>
+          </a:stretch>
+        </p:blipFill>
+        <p:spPr>
+          <a:xfrm>
+            <a:off x="0" y="0"/>
+            <a:ext cx="12192000" cy="6858000"/>
+          </a:xfrm>
+          <a:prstGeom prst="rect">
+            <a:avLst/>
+          </a:prstGeom>
+        </p:spPr>
+      </p:pic>
+      <p:sp>
+        <p:nvSpPr>
+          <p:cNvPr id="12" name="Oval 11">
+            <a:extLst>
+              <a:ext uri="{FF2B5EF4-FFF2-40B4-BE49-F238E27FC236}">
+                <a16:creationId xmlns:a16="http://schemas.microsoft.com/office/drawing/2014/main" id="{569C1A01-6FB5-43CE-ADCC-936728ACAC0D}"/>
+              </a:ext>
+              <a:ext uri="{C183D7F6-B498-43B3-948B-1728B52AA6E4}">
+                <adec:decorative xmlns:adec="http://schemas.microsoft.com/office/drawing/2017/decorative" val="1"/>
+              </a:ext>
+            </a:extLst>
+          </p:cNvPr>
+          <p:cNvSpPr>
+            <a:spLocks noGrp="1" noRot="1" noChangeAspect="1" noMove="1" noResize="1" noEditPoints="1" noAdjustHandles="1" noChangeArrowheads="1" noChangeShapeType="1" noTextEdit="1"/>
+          </p:cNvSpPr>
+          <p:nvPr>
+            <p:extLst>
+              <p:ext uri="{386F3935-93C4-4BCD-93E2-E3B085C9AB24}">
+                <p16:designElem xmlns:p16="http://schemas.microsoft.com/office/powerpoint/2015/main" val="1"/>
+              </p:ext>
+            </p:extLst>
+          </p:nvPr>
+        </p:nvSpPr>
+        <p:spPr>
+          <a:xfrm>
+            <a:off x="1456267" y="4388303"/>
+            <a:ext cx="824089" cy="702986"/>
+          </a:xfrm>
+          <a:prstGeom prst="ellipse">
+            <a:avLst/>
+          </a:prstGeom>
+          <a:solidFill>
+            <a:srgbClr val="FFFFFF"/>
+          </a:solidFill>
+          <a:ln>
+            <a:noFill/>
+          </a:ln>
+        </p:spPr>
+        <p:style>
+          <a:lnRef idx="2">
+            <a:schemeClr val="accent1">
+              <a:shade val="50000"/>
+            </a:schemeClr>
+          </a:lnRef>
+          <a:fillRef idx="1">
+            <a:schemeClr val="accent1"/>
+          </a:fillRef>
+          <a:effectRef idx="0">
+            <a:schemeClr val="accent1"/>
+          </a:effectRef>
+          <a:fontRef idx="minor">
+            <a:schemeClr val="lt1"/>
+          </a:fontRef>
+        </p:style>
+        <p:txBody>
+          <a:bodyPr rtlCol="0" anchor="ctr"/>
+          <a:lstStyle/>
+          <a:p>
+            <a:pPr algn="ctr"/>
+            <a:endParaRPr lang="en-US"/>
+          </a:p>
+        </p:txBody>
+      </p:sp>
+      <p:sp>
+        <p:nvSpPr>
+          <p:cNvPr id="2" name="Titel 1">
+            <a:extLst>
+              <a:ext uri="{FF2B5EF4-FFF2-40B4-BE49-F238E27FC236}">
+                <a16:creationId xmlns:a16="http://schemas.microsoft.com/office/drawing/2014/main" id="{6452898C-ED67-4784-A05F-DB6E1EAF7FF4}"/>
+              </a:ext>
+            </a:extLst>
+          </p:cNvPr>
+          <p:cNvSpPr>
+            <a:spLocks noGrp="1"/>
+          </p:cNvSpPr>
+          <p:nvPr>
+            <p:ph type="title"/>
+          </p:nvPr>
+        </p:nvSpPr>
+        <p:spPr>
+          <a:xfrm>
+            <a:off x="804998" y="4551037"/>
+            <a:ext cx="5021782" cy="1509931"/>
+          </a:xfrm>
+        </p:spPr>
+        <p:txBody>
+          <a:bodyPr>
+            <a:normAutofit/>
+          </a:bodyPr>
+          <a:lstStyle/>
+          <a:p>
+            <a:r>
+              <a:rPr lang="nl-BE" sz="4000">
+                <a:solidFill>
+                  <a:srgbClr val="000000"/>
+                </a:solidFill>
+              </a:rPr>
+              <a:t>De 4 helden</a:t>
+            </a:r>
+          </a:p>
+        </p:txBody>
+      </p:sp>
+      <p:sp>
+        <p:nvSpPr>
+          <p:cNvPr id="3" name="Tijdelijke aanduiding voor inhoud 2">
+            <a:extLst>
+              <a:ext uri="{FF2B5EF4-FFF2-40B4-BE49-F238E27FC236}">
+                <a16:creationId xmlns:a16="http://schemas.microsoft.com/office/drawing/2014/main" id="{AD9CC6EA-7EFB-4BC7-9DDA-B5F10CF12F5B}"/>
+              </a:ext>
+            </a:extLst>
+          </p:cNvPr>
+          <p:cNvSpPr>
+            <a:spLocks noGrp="1"/>
+          </p:cNvSpPr>
+          <p:nvPr>
+            <p:ph idx="1"/>
+          </p:nvPr>
+        </p:nvSpPr>
+        <p:spPr>
+          <a:xfrm>
+            <a:off x="6470247" y="4551037"/>
+            <a:ext cx="4926411" cy="1509935"/>
+          </a:xfrm>
+        </p:spPr>
+        <p:txBody>
+          <a:bodyPr anchor="ctr">
+            <a:normAutofit/>
+          </a:bodyPr>
+          <a:lstStyle/>
+          <a:p>
+            <a:endParaRPr lang="nl-BE" sz="1800" dirty="0">
+              <a:solidFill>
+                <a:srgbClr val="000000"/>
+              </a:solidFill>
+            </a:endParaRPr>
+          </a:p>
+        </p:txBody>
+      </p:sp>
+    </p:spTree>
+    <p:extLst>
+      <p:ext uri="{BB962C8B-B14F-4D97-AF65-F5344CB8AC3E}">
+        <p14:creationId xmlns:p14="http://schemas.microsoft.com/office/powerpoint/2010/main" val="85647354"/>
+      </p:ext>
+    </p:extLst>
+  </p:cSld>
+  <p:clrMapOvr>
+    <a:masterClrMapping/>
+  </p:clrMapOvr>
+</p:sld>
+</file>
+
+<file path=ppt/slides/slide11.xml><?xml version="1.0" encoding="utf-8"?>
+<p:sld xmlns:a="http://schemas.openxmlformats.org/drawingml/2006/main" xmlns:r="http://schemas.openxmlformats.org/officeDocument/2006/relationships" xmlns:p="http://schemas.openxmlformats.org/presentationml/2006/main">
+  <p:cSld>
     <p:spTree>
       <p:nvGrpSpPr>
         <p:cNvPr id="1" name=""/>
@@ -4895,6 +5162,132 @@
 <file path=ppt/slides/slide7.xml><?xml version="1.0" encoding="utf-8"?>
 <p:sld xmlns:a="http://schemas.openxmlformats.org/drawingml/2006/main" xmlns:r="http://schemas.openxmlformats.org/officeDocument/2006/relationships" xmlns:p="http://schemas.openxmlformats.org/presentationml/2006/main">
   <p:cSld>
+    <p:spTree>
+      <p:nvGrpSpPr>
+        <p:cNvPr id="1" name=""/>
+        <p:cNvGrpSpPr/>
+        <p:nvPr/>
+      </p:nvGrpSpPr>
+      <p:grpSpPr>
+        <a:xfrm>
+          <a:off x="0" y="0"/>
+          <a:ext cx="0" cy="0"/>
+          <a:chOff x="0" y="0"/>
+          <a:chExt cx="0" cy="0"/>
+        </a:xfrm>
+      </p:grpSpPr>
+      <p:sp>
+        <p:nvSpPr>
+          <p:cNvPr id="2" name="Titel 1">
+            <a:extLst>
+              <a:ext uri="{FF2B5EF4-FFF2-40B4-BE49-F238E27FC236}">
+                <a16:creationId xmlns:a16="http://schemas.microsoft.com/office/drawing/2014/main" id="{FABB050E-64A8-4E3E-8C11-EC9CC534D087}"/>
+              </a:ext>
+            </a:extLst>
+          </p:cNvPr>
+          <p:cNvSpPr>
+            <a:spLocks noGrp="1"/>
+          </p:cNvSpPr>
+          <p:nvPr>
+            <p:ph type="title"/>
+          </p:nvPr>
+        </p:nvSpPr>
+        <p:spPr/>
+        <p:txBody>
+          <a:bodyPr/>
+          <a:lstStyle/>
+          <a:p>
+            <a:r>
+              <a:rPr lang="nl-BE" dirty="0" err="1"/>
+              <a:t>Let’s</a:t>
+            </a:r>
+            <a:r>
+              <a:rPr lang="nl-BE" dirty="0"/>
+              <a:t> get </a:t>
+            </a:r>
+            <a:r>
+              <a:rPr lang="nl-BE" dirty="0" err="1"/>
+              <a:t>started</a:t>
+            </a:r>
+            <a:endParaRPr lang="nl-BE" dirty="0"/>
+          </a:p>
+        </p:txBody>
+      </p:sp>
+      <p:sp>
+        <p:nvSpPr>
+          <p:cNvPr id="3" name="Tijdelijke aanduiding voor inhoud 2">
+            <a:extLst>
+              <a:ext uri="{FF2B5EF4-FFF2-40B4-BE49-F238E27FC236}">
+                <a16:creationId xmlns:a16="http://schemas.microsoft.com/office/drawing/2014/main" id="{8674B5F9-6831-438A-AB49-E33FA981B242}"/>
+              </a:ext>
+            </a:extLst>
+          </p:cNvPr>
+          <p:cNvSpPr>
+            <a:spLocks noGrp="1"/>
+          </p:cNvSpPr>
+          <p:nvPr>
+            <p:ph idx="1"/>
+          </p:nvPr>
+        </p:nvSpPr>
+        <p:spPr/>
+        <p:txBody>
+          <a:bodyPr/>
+          <a:lstStyle/>
+          <a:p>
+            <a:r>
+              <a:rPr lang="nl-BE" dirty="0"/>
+              <a:t>We voegen wat </a:t>
+            </a:r>
+            <a:r>
+              <a:rPr lang="nl-BE" dirty="0" err="1"/>
+              <a:t>github</a:t>
+            </a:r>
+            <a:r>
+              <a:rPr lang="nl-BE" dirty="0"/>
+              <a:t> tricks toe ;)</a:t>
+            </a:r>
+          </a:p>
+          <a:p>
+            <a:endParaRPr lang="nl-BE" dirty="0"/>
+          </a:p>
+          <a:p>
+            <a:r>
+              <a:rPr lang="nl-BE" dirty="0" err="1"/>
+              <a:t>Clone</a:t>
+            </a:r>
+            <a:r>
+              <a:rPr lang="nl-BE" dirty="0"/>
+              <a:t> volgende project:</a:t>
+            </a:r>
+          </a:p>
+          <a:p>
+            <a:pPr lvl="1"/>
+            <a:r>
+              <a:rPr lang="nl-BE" dirty="0">
+                <a:hlinkClick r:id="rId2"/>
+              </a:rPr>
+              <a:t>https://github.com/AP-Elektronica-ICT/HeroopQuest</a:t>
+            </a:r>
+            <a:endParaRPr lang="nl-BE" dirty="0"/>
+          </a:p>
+        </p:txBody>
+      </p:sp>
+    </p:spTree>
+    <p:extLst>
+      <p:ext uri="{BB962C8B-B14F-4D97-AF65-F5344CB8AC3E}">
+        <p14:creationId xmlns:p14="http://schemas.microsoft.com/office/powerpoint/2010/main" val="69825757"/>
+      </p:ext>
+    </p:extLst>
+  </p:cSld>
+  <p:clrMapOvr>
+    <a:masterClrMapping/>
+  </p:clrMapOvr>
+</p:sld>
+</file>
+
+<file path=ppt/slides/slide8.xml><?xml version="1.0" encoding="utf-8"?>
+<p:sld xmlns:a="http://schemas.openxmlformats.org/drawingml/2006/main" xmlns:r="http://schemas.openxmlformats.org/officeDocument/2006/relationships" xmlns:p="http://schemas.openxmlformats.org/presentationml/2006/main">
+  <p:cSld>
     <p:bg>
       <p:bgPr>
         <a:solidFill>
@@ -5084,7 +5477,7 @@
 </p:sld>
 </file>
 
-<file path=ppt/slides/slide8.xml><?xml version="1.0" encoding="utf-8"?>
+<file path=ppt/slides/slide9.xml><?xml version="1.0" encoding="utf-8"?>
 <p:sld xmlns:a="http://schemas.openxmlformats.org/drawingml/2006/main" xmlns:r="http://schemas.openxmlformats.org/officeDocument/2006/relationships" xmlns:p="http://schemas.openxmlformats.org/presentationml/2006/main">
   <p:cSld>
     <p:spTree>
@@ -5218,272 +5611,6 @@
     <p:extLst>
       <p:ext uri="{BB962C8B-B14F-4D97-AF65-F5344CB8AC3E}">
         <p14:creationId xmlns:p14="http://schemas.microsoft.com/office/powerpoint/2010/main" val="1815983279"/>
-      </p:ext>
-    </p:extLst>
-  </p:cSld>
-  <p:clrMapOvr>
-    <a:masterClrMapping/>
-  </p:clrMapOvr>
-</p:sld>
-</file>
-
-<file path=ppt/slides/slide9.xml><?xml version="1.0" encoding="utf-8"?>
-<p:sld xmlns:a="http://schemas.openxmlformats.org/drawingml/2006/main" xmlns:r="http://schemas.openxmlformats.org/officeDocument/2006/relationships" xmlns:p="http://schemas.openxmlformats.org/presentationml/2006/main">
-  <p:cSld>
-    <p:bg>
-      <p:bgPr>
-        <a:solidFill>
-          <a:schemeClr val="bg1"/>
-        </a:solidFill>
-        <a:effectLst/>
-      </p:bgPr>
-    </p:bg>
-    <p:spTree>
-      <p:nvGrpSpPr>
-        <p:cNvPr id="1" name=""/>
-        <p:cNvGrpSpPr/>
-        <p:nvPr/>
-      </p:nvGrpSpPr>
-      <p:grpSpPr>
-        <a:xfrm>
-          <a:off x="0" y="0"/>
-          <a:ext cx="0" cy="0"/>
-          <a:chOff x="0" y="0"/>
-          <a:chExt cx="0" cy="0"/>
-        </a:xfrm>
-      </p:grpSpPr>
-      <p:pic>
-        <p:nvPicPr>
-          <p:cNvPr id="4" name="Picture 2" descr="Afbeeldingsresultaat voor heroquest hleden">
-            <a:extLst>
-              <a:ext uri="{FF2B5EF4-FFF2-40B4-BE49-F238E27FC236}">
-                <a16:creationId xmlns:a16="http://schemas.microsoft.com/office/drawing/2014/main" id="{612118AA-A92F-4A82-8712-BC68F992E42A}"/>
-              </a:ext>
-            </a:extLst>
-          </p:cNvPr>
-          <p:cNvPicPr>
-            <a:picLocks noChangeAspect="1" noChangeArrowheads="1"/>
-          </p:cNvPicPr>
-          <p:nvPr/>
-        </p:nvPicPr>
-        <p:blipFill rotWithShape="1">
-          <a:blip r:embed="rId2">
-            <a:extLst>
-              <a:ext uri="{28A0092B-C50C-407E-A947-70E740481C1C}">
-                <a14:useLocalDpi xmlns:a14="http://schemas.microsoft.com/office/drawing/2010/main" val="0"/>
-              </a:ext>
-            </a:extLst>
-          </a:blip>
-          <a:srcRect l="1300" r="5306"/>
-          <a:stretch/>
-        </p:blipFill>
-        <p:spPr bwMode="auto">
-          <a:xfrm>
-            <a:off x="-1" y="-197258"/>
-            <a:ext cx="12192001" cy="4666928"/>
-          </a:xfrm>
-          <a:prstGeom prst="rect">
-            <a:avLst/>
-          </a:prstGeom>
-          <a:noFill/>
-          <a:extLst>
-            <a:ext uri="{909E8E84-426E-40DD-AFC4-6F175D3DCCD1}">
-              <a14:hiddenFill xmlns:a14="http://schemas.microsoft.com/office/drawing/2010/main">
-                <a:solidFill>
-                  <a:srgbClr val="FFFFFF"/>
-                </a:solidFill>
-              </a14:hiddenFill>
-            </a:ext>
-          </a:extLst>
-        </p:spPr>
-      </p:pic>
-      <p:pic>
-        <p:nvPicPr>
-          <p:cNvPr id="10" name="Picture 9">
-            <a:extLst>
-              <a:ext uri="{FF2B5EF4-FFF2-40B4-BE49-F238E27FC236}">
-                <a16:creationId xmlns:a16="http://schemas.microsoft.com/office/drawing/2014/main" id="{EE09A529-E47C-4634-BB98-0A9526C372B4}"/>
-              </a:ext>
-              <a:ext uri="{C183D7F6-B498-43B3-948B-1728B52AA6E4}">
-                <adec:decorative xmlns:adec="http://schemas.microsoft.com/office/drawing/2017/decorative" val="1"/>
-              </a:ext>
-            </a:extLst>
-          </p:cNvPr>
-          <p:cNvPicPr>
-            <a:picLocks noGrp="1" noRot="1" noChangeAspect="1" noMove="1" noResize="1" noEditPoints="1" noAdjustHandles="1" noChangeArrowheads="1" noChangeShapeType="1" noCrop="1"/>
-          </p:cNvPicPr>
-          <p:nvPr>
-            <p:extLst>
-              <p:ext uri="{386F3935-93C4-4BCD-93E2-E3B085C9AB24}">
-                <p16:designElem xmlns:p16="http://schemas.microsoft.com/office/powerpoint/2015/main" val="1"/>
-              </p:ext>
-            </p:extLst>
-          </p:nvPr>
-        </p:nvPicPr>
-        <p:blipFill>
-          <a:blip r:embed="rId3">
-            <a:extLst>
-              <a:ext uri="{28A0092B-C50C-407E-A947-70E740481C1C}">
-                <a14:useLocalDpi xmlns:a14="http://schemas.microsoft.com/office/drawing/2010/main" val="0"/>
-              </a:ext>
-            </a:extLst>
-          </a:blip>
-          <a:stretch>
-            <a:fillRect/>
-          </a:stretch>
-        </p:blipFill>
-        <p:spPr>
-          <a:xfrm>
-            <a:off x="0" y="0"/>
-            <a:ext cx="12192000" cy="6858000"/>
-          </a:xfrm>
-          <a:prstGeom prst="rect">
-            <a:avLst/>
-          </a:prstGeom>
-        </p:spPr>
-      </p:pic>
-      <p:sp>
-        <p:nvSpPr>
-          <p:cNvPr id="12" name="Oval 11">
-            <a:extLst>
-              <a:ext uri="{FF2B5EF4-FFF2-40B4-BE49-F238E27FC236}">
-                <a16:creationId xmlns:a16="http://schemas.microsoft.com/office/drawing/2014/main" id="{569C1A01-6FB5-43CE-ADCC-936728ACAC0D}"/>
-              </a:ext>
-              <a:ext uri="{C183D7F6-B498-43B3-948B-1728B52AA6E4}">
-                <adec:decorative xmlns:adec="http://schemas.microsoft.com/office/drawing/2017/decorative" val="1"/>
-              </a:ext>
-            </a:extLst>
-          </p:cNvPr>
-          <p:cNvSpPr>
-            <a:spLocks noGrp="1" noRot="1" noChangeAspect="1" noMove="1" noResize="1" noEditPoints="1" noAdjustHandles="1" noChangeArrowheads="1" noChangeShapeType="1" noTextEdit="1"/>
-          </p:cNvSpPr>
-          <p:nvPr>
-            <p:extLst>
-              <p:ext uri="{386F3935-93C4-4BCD-93E2-E3B085C9AB24}">
-                <p16:designElem xmlns:p16="http://schemas.microsoft.com/office/powerpoint/2015/main" val="1"/>
-              </p:ext>
-            </p:extLst>
-          </p:nvPr>
-        </p:nvSpPr>
-        <p:spPr>
-          <a:xfrm>
-            <a:off x="1456267" y="4388303"/>
-            <a:ext cx="824089" cy="702986"/>
-          </a:xfrm>
-          <a:prstGeom prst="ellipse">
-            <a:avLst/>
-          </a:prstGeom>
-          <a:solidFill>
-            <a:srgbClr val="FFFFFF"/>
-          </a:solidFill>
-          <a:ln>
-            <a:noFill/>
-          </a:ln>
-        </p:spPr>
-        <p:style>
-          <a:lnRef idx="2">
-            <a:schemeClr val="accent1">
-              <a:shade val="50000"/>
-            </a:schemeClr>
-          </a:lnRef>
-          <a:fillRef idx="1">
-            <a:schemeClr val="accent1"/>
-          </a:fillRef>
-          <a:effectRef idx="0">
-            <a:schemeClr val="accent1"/>
-          </a:effectRef>
-          <a:fontRef idx="minor">
-            <a:schemeClr val="lt1"/>
-          </a:fontRef>
-        </p:style>
-        <p:txBody>
-          <a:bodyPr rtlCol="0" anchor="ctr"/>
-          <a:lstStyle/>
-          <a:p>
-            <a:pPr algn="ctr"/>
-            <a:endParaRPr lang="en-US"/>
-          </a:p>
-        </p:txBody>
-      </p:sp>
-      <p:sp>
-        <p:nvSpPr>
-          <p:cNvPr id="2" name="Titel 1">
-            <a:extLst>
-              <a:ext uri="{FF2B5EF4-FFF2-40B4-BE49-F238E27FC236}">
-                <a16:creationId xmlns:a16="http://schemas.microsoft.com/office/drawing/2014/main" id="{6452898C-ED67-4784-A05F-DB6E1EAF7FF4}"/>
-              </a:ext>
-            </a:extLst>
-          </p:cNvPr>
-          <p:cNvSpPr>
-            <a:spLocks noGrp="1"/>
-          </p:cNvSpPr>
-          <p:nvPr>
-            <p:ph type="title"/>
-          </p:nvPr>
-        </p:nvSpPr>
-        <p:spPr>
-          <a:xfrm>
-            <a:off x="804998" y="4551037"/>
-            <a:ext cx="5021782" cy="1509931"/>
-          </a:xfrm>
-        </p:spPr>
-        <p:txBody>
-          <a:bodyPr>
-            <a:normAutofit/>
-          </a:bodyPr>
-          <a:lstStyle/>
-          <a:p>
-            <a:r>
-              <a:rPr lang="nl-BE" sz="4000">
-                <a:solidFill>
-                  <a:srgbClr val="000000"/>
-                </a:solidFill>
-              </a:rPr>
-              <a:t>De 4 helden</a:t>
-            </a:r>
-          </a:p>
-        </p:txBody>
-      </p:sp>
-      <p:sp>
-        <p:nvSpPr>
-          <p:cNvPr id="3" name="Tijdelijke aanduiding voor inhoud 2">
-            <a:extLst>
-              <a:ext uri="{FF2B5EF4-FFF2-40B4-BE49-F238E27FC236}">
-                <a16:creationId xmlns:a16="http://schemas.microsoft.com/office/drawing/2014/main" id="{AD9CC6EA-7EFB-4BC7-9DDA-B5F10CF12F5B}"/>
-              </a:ext>
-            </a:extLst>
-          </p:cNvPr>
-          <p:cNvSpPr>
-            <a:spLocks noGrp="1"/>
-          </p:cNvSpPr>
-          <p:nvPr>
-            <p:ph idx="1"/>
-          </p:nvPr>
-        </p:nvSpPr>
-        <p:spPr>
-          <a:xfrm>
-            <a:off x="6470247" y="4551037"/>
-            <a:ext cx="4926411" cy="1509935"/>
-          </a:xfrm>
-        </p:spPr>
-        <p:txBody>
-          <a:bodyPr anchor="ctr">
-            <a:normAutofit/>
-          </a:bodyPr>
-          <a:lstStyle/>
-          <a:p>
-            <a:endParaRPr lang="nl-BE" sz="1800" dirty="0">
-              <a:solidFill>
-                <a:srgbClr val="000000"/>
-              </a:solidFill>
-            </a:endParaRPr>
-          </a:p>
-        </p:txBody>
-      </p:sp>
-    </p:spTree>
-    <p:extLst>
-      <p:ext uri="{BB962C8B-B14F-4D97-AF65-F5344CB8AC3E}">
-        <p14:creationId xmlns:p14="http://schemas.microsoft.com/office/powerpoint/2010/main" val="85647354"/>
       </p:ext>
     </p:extLst>
   </p:cSld>

</xml_diff>